<commit_message>
Change all navigation into navbar
</commit_message>
<xml_diff>
--- a/docs/NCC WEB.pptx
+++ b/docs/NCC WEB.pptx
@@ -5607,8 +5607,8 @@
         </p:nvSpPr>
         <p:spPr>
           <a:xfrm>
-            <a:off x="1989438" y="1124465"/>
-            <a:ext cx="6166021" cy="2308324"/>
+            <a:off x="4170406" y="3175686"/>
+            <a:ext cx="1717588" cy="1754326"/>
           </a:xfrm>
           <a:prstGeom prst="rect">
             <a:avLst/>
@@ -5622,19 +5622,6 @@
           <a:lstStyle/>
           <a:p>
             <a:r>
-              <a:rPr lang="en-IN" dirty="0" err="1"/>
-              <a:t>Ejs</a:t>
-            </a:r>
-            <a:r>
-              <a:rPr lang="en-IN" dirty="0"/>
-              <a:t> Template</a:t>
-            </a:r>
-          </a:p>
-          <a:p>
-            <a:endParaRPr lang="en-IN" dirty="0"/>
-          </a:p>
-          <a:p>
-            <a:r>
               <a:rPr lang="en-IN" dirty="0"/>
               <a:t>1.Cadet detail</a:t>
             </a:r>
@@ -5661,6 +5648,217 @@
             <a:r>
               <a:rPr lang="en-IN" dirty="0"/>
               <a:t>5.Achievers</a:t>
+            </a:r>
+          </a:p>
+          <a:p>
+            <a:endParaRPr lang="en-IN" dirty="0"/>
+          </a:p>
+        </p:txBody>
+      </p:sp>
+      <p:sp>
+        <p:nvSpPr>
+          <p:cNvPr id="2" name="Rectangle 1">
+            <a:extLst>
+              <a:ext uri="{FF2B5EF4-FFF2-40B4-BE49-F238E27FC236}">
+                <a16:creationId xmlns:a16="http://schemas.microsoft.com/office/drawing/2014/main" id="{9E9FDAC6-643C-48EF-849B-864DBEF45672}"/>
+              </a:ext>
+            </a:extLst>
+          </p:cNvPr>
+          <p:cNvSpPr/>
+          <p:nvPr/>
+        </p:nvSpPr>
+        <p:spPr>
+          <a:xfrm>
+            <a:off x="4522573" y="803189"/>
+            <a:ext cx="2903838" cy="815546"/>
+          </a:xfrm>
+          <a:prstGeom prst="rect">
+            <a:avLst/>
+          </a:prstGeom>
+        </p:spPr>
+        <p:style>
+          <a:lnRef idx="2">
+            <a:schemeClr val="accent1">
+              <a:shade val="50000"/>
+            </a:schemeClr>
+          </a:lnRef>
+          <a:fillRef idx="1">
+            <a:schemeClr val="accent1"/>
+          </a:fillRef>
+          <a:effectRef idx="0">
+            <a:schemeClr val="accent1"/>
+          </a:effectRef>
+          <a:fontRef idx="minor">
+            <a:schemeClr val="lt1"/>
+          </a:fontRef>
+        </p:style>
+        <p:txBody>
+          <a:bodyPr rtlCol="0" anchor="ctr"/>
+          <a:lstStyle/>
+          <a:p>
+            <a:pPr algn="ctr"/>
+            <a:r>
+              <a:rPr lang="en-IN" dirty="0"/>
+              <a:t>EJS Template</a:t>
+            </a:r>
+          </a:p>
+        </p:txBody>
+      </p:sp>
+      <p:cxnSp>
+        <p:nvCxnSpPr>
+          <p:cNvPr id="4" name="Connector: Elbow 3">
+            <a:extLst>
+              <a:ext uri="{FF2B5EF4-FFF2-40B4-BE49-F238E27FC236}">
+                <a16:creationId xmlns:a16="http://schemas.microsoft.com/office/drawing/2014/main" id="{FFEC9241-33A6-4A3C-A579-5BABD30477A6}"/>
+              </a:ext>
+            </a:extLst>
+          </p:cNvPr>
+          <p:cNvCxnSpPr>
+            <a:cxnSpLocks/>
+          </p:cNvCxnSpPr>
+          <p:nvPr/>
+        </p:nvCxnSpPr>
+        <p:spPr>
+          <a:xfrm>
+            <a:off x="5966769" y="2100648"/>
+            <a:ext cx="1503405" cy="827903"/>
+          </a:xfrm>
+          <a:prstGeom prst="bentConnector3">
+            <a:avLst/>
+          </a:prstGeom>
+        </p:spPr>
+        <p:style>
+          <a:lnRef idx="1">
+            <a:schemeClr val="accent1"/>
+          </a:lnRef>
+          <a:fillRef idx="0">
+            <a:schemeClr val="accent1"/>
+          </a:fillRef>
+          <a:effectRef idx="0">
+            <a:schemeClr val="accent1"/>
+          </a:effectRef>
+          <a:fontRef idx="minor">
+            <a:schemeClr val="tx1"/>
+          </a:fontRef>
+        </p:style>
+      </p:cxnSp>
+      <p:cxnSp>
+        <p:nvCxnSpPr>
+          <p:cNvPr id="8" name="Connector: Elbow 7">
+            <a:extLst>
+              <a:ext uri="{FF2B5EF4-FFF2-40B4-BE49-F238E27FC236}">
+                <a16:creationId xmlns:a16="http://schemas.microsoft.com/office/drawing/2014/main" id="{B802A3FF-ED39-41E3-BB41-18ACD4A14C92}"/>
+              </a:ext>
+            </a:extLst>
+          </p:cNvPr>
+          <p:cNvCxnSpPr>
+            <a:cxnSpLocks/>
+          </p:cNvCxnSpPr>
+          <p:nvPr/>
+        </p:nvCxnSpPr>
+        <p:spPr>
+          <a:xfrm rot="10800000" flipV="1">
+            <a:off x="4170406" y="2100648"/>
+            <a:ext cx="1804086" cy="852616"/>
+          </a:xfrm>
+          <a:prstGeom prst="bentConnector3">
+            <a:avLst>
+              <a:gd name="adj1" fmla="val 50000"/>
+            </a:avLst>
+          </a:prstGeom>
+        </p:spPr>
+        <p:style>
+          <a:lnRef idx="1">
+            <a:schemeClr val="accent1"/>
+          </a:lnRef>
+          <a:fillRef idx="0">
+            <a:schemeClr val="accent1"/>
+          </a:fillRef>
+          <a:effectRef idx="0">
+            <a:schemeClr val="accent1"/>
+          </a:effectRef>
+          <a:fontRef idx="minor">
+            <a:schemeClr val="tx1"/>
+          </a:fontRef>
+        </p:style>
+      </p:cxnSp>
+      <p:cxnSp>
+        <p:nvCxnSpPr>
+          <p:cNvPr id="12" name="Straight Connector 11">
+            <a:extLst>
+              <a:ext uri="{FF2B5EF4-FFF2-40B4-BE49-F238E27FC236}">
+                <a16:creationId xmlns:a16="http://schemas.microsoft.com/office/drawing/2014/main" id="{1B4DCE6F-EE9E-4ADB-A4C0-601388196CB0}"/>
+              </a:ext>
+            </a:extLst>
+          </p:cNvPr>
+          <p:cNvCxnSpPr>
+            <a:cxnSpLocks/>
+            <a:stCxn id="2" idx="2"/>
+          </p:cNvCxnSpPr>
+          <p:nvPr/>
+        </p:nvCxnSpPr>
+        <p:spPr>
+          <a:xfrm flipH="1">
+            <a:off x="5966769" y="1618735"/>
+            <a:ext cx="7723" cy="481913"/>
+          </a:xfrm>
+          <a:prstGeom prst="line">
+            <a:avLst/>
+          </a:prstGeom>
+        </p:spPr>
+        <p:style>
+          <a:lnRef idx="1">
+            <a:schemeClr val="accent1"/>
+          </a:lnRef>
+          <a:fillRef idx="0">
+            <a:schemeClr val="accent1"/>
+          </a:fillRef>
+          <a:effectRef idx="0">
+            <a:schemeClr val="accent1"/>
+          </a:effectRef>
+          <a:fontRef idx="minor">
+            <a:schemeClr val="tx1"/>
+          </a:fontRef>
+        </p:style>
+      </p:cxnSp>
+      <p:sp>
+        <p:nvSpPr>
+          <p:cNvPr id="18" name="TextBox 17">
+            <a:extLst>
+              <a:ext uri="{FF2B5EF4-FFF2-40B4-BE49-F238E27FC236}">
+                <a16:creationId xmlns:a16="http://schemas.microsoft.com/office/drawing/2014/main" id="{94324F67-101C-4078-B932-460914922400}"/>
+              </a:ext>
+            </a:extLst>
+          </p:cNvPr>
+          <p:cNvSpPr txBox="1"/>
+          <p:nvPr/>
+        </p:nvSpPr>
+        <p:spPr>
+          <a:xfrm>
+            <a:off x="6969211" y="3175686"/>
+            <a:ext cx="1235676" cy="923330"/>
+          </a:xfrm>
+          <a:prstGeom prst="rect">
+            <a:avLst/>
+          </a:prstGeom>
+          <a:noFill/>
+        </p:spPr>
+        <p:txBody>
+          <a:bodyPr wrap="square" rtlCol="0">
+            <a:spAutoFit/>
+          </a:bodyPr>
+          <a:lstStyle/>
+          <a:p>
+            <a:r>
+              <a:rPr lang="en-IN" dirty="0" err="1"/>
+              <a:t>Batchs</a:t>
+            </a:r>
+            <a:endParaRPr lang="en-IN" dirty="0"/>
+          </a:p>
+          <a:p>
+            <a:r>
+              <a:rPr lang="en-IN" dirty="0"/>
+              <a:t>Alumni</a:t>
             </a:r>
           </a:p>
           <a:p>

</xml_diff>